<commit_message>
New read/write functionality for Administration entities
</commit_message>
<xml_diff>
--- a/Documents/Administration Schema ERD.pptx
+++ b/Documents/Administration Schema ERD.pptx
@@ -247,7 +247,7 @@
           <a:p>
             <a:fld id="{6B763B27-ABB2-441F-B869-D878362298D3}" type="datetimeFigureOut">
               <a:rPr lang="en-GB" smtClean="0"/>
-              <a:t>16/02/2016</a:t>
+              <a:t>17/02/2016</a:t>
             </a:fld>
             <a:endParaRPr lang="en-GB"/>
           </a:p>
@@ -417,7 +417,7 @@
           <a:p>
             <a:fld id="{6B763B27-ABB2-441F-B869-D878362298D3}" type="datetimeFigureOut">
               <a:rPr lang="en-GB" smtClean="0"/>
-              <a:t>16/02/2016</a:t>
+              <a:t>17/02/2016</a:t>
             </a:fld>
             <a:endParaRPr lang="en-GB"/>
           </a:p>
@@ -597,7 +597,7 @@
           <a:p>
             <a:fld id="{6B763B27-ABB2-441F-B869-D878362298D3}" type="datetimeFigureOut">
               <a:rPr lang="en-GB" smtClean="0"/>
-              <a:t>16/02/2016</a:t>
+              <a:t>17/02/2016</a:t>
             </a:fld>
             <a:endParaRPr lang="en-GB"/>
           </a:p>
@@ -767,7 +767,7 @@
           <a:p>
             <a:fld id="{6B763B27-ABB2-441F-B869-D878362298D3}" type="datetimeFigureOut">
               <a:rPr lang="en-GB" smtClean="0"/>
-              <a:t>16/02/2016</a:t>
+              <a:t>17/02/2016</a:t>
             </a:fld>
             <a:endParaRPr lang="en-GB"/>
           </a:p>
@@ -1013,7 +1013,7 @@
           <a:p>
             <a:fld id="{6B763B27-ABB2-441F-B869-D878362298D3}" type="datetimeFigureOut">
               <a:rPr lang="en-GB" smtClean="0"/>
-              <a:t>16/02/2016</a:t>
+              <a:t>17/02/2016</a:t>
             </a:fld>
             <a:endParaRPr lang="en-GB"/>
           </a:p>
@@ -1245,7 +1245,7 @@
           <a:p>
             <a:fld id="{6B763B27-ABB2-441F-B869-D878362298D3}" type="datetimeFigureOut">
               <a:rPr lang="en-GB" smtClean="0"/>
-              <a:t>16/02/2016</a:t>
+              <a:t>17/02/2016</a:t>
             </a:fld>
             <a:endParaRPr lang="en-GB"/>
           </a:p>
@@ -1612,7 +1612,7 @@
           <a:p>
             <a:fld id="{6B763B27-ABB2-441F-B869-D878362298D3}" type="datetimeFigureOut">
               <a:rPr lang="en-GB" smtClean="0"/>
-              <a:t>16/02/2016</a:t>
+              <a:t>17/02/2016</a:t>
             </a:fld>
             <a:endParaRPr lang="en-GB"/>
           </a:p>
@@ -1730,7 +1730,7 @@
           <a:p>
             <a:fld id="{6B763B27-ABB2-441F-B869-D878362298D3}" type="datetimeFigureOut">
               <a:rPr lang="en-GB" smtClean="0"/>
-              <a:t>16/02/2016</a:t>
+              <a:t>17/02/2016</a:t>
             </a:fld>
             <a:endParaRPr lang="en-GB"/>
           </a:p>
@@ -1825,7 +1825,7 @@
           <a:p>
             <a:fld id="{6B763B27-ABB2-441F-B869-D878362298D3}" type="datetimeFigureOut">
               <a:rPr lang="en-GB" smtClean="0"/>
-              <a:t>16/02/2016</a:t>
+              <a:t>17/02/2016</a:t>
             </a:fld>
             <a:endParaRPr lang="en-GB"/>
           </a:p>
@@ -2102,7 +2102,7 @@
           <a:p>
             <a:fld id="{6B763B27-ABB2-441F-B869-D878362298D3}" type="datetimeFigureOut">
               <a:rPr lang="en-GB" smtClean="0"/>
-              <a:t>16/02/2016</a:t>
+              <a:t>17/02/2016</a:t>
             </a:fld>
             <a:endParaRPr lang="en-GB"/>
           </a:p>
@@ -2355,7 +2355,7 @@
           <a:p>
             <a:fld id="{6B763B27-ABB2-441F-B869-D878362298D3}" type="datetimeFigureOut">
               <a:rPr lang="en-GB" smtClean="0"/>
-              <a:t>16/02/2016</a:t>
+              <a:t>17/02/2016</a:t>
             </a:fld>
             <a:endParaRPr lang="en-GB"/>
           </a:p>
@@ -2568,7 +2568,7 @@
           <a:p>
             <a:fld id="{6B763B27-ABB2-441F-B869-D878362298D3}" type="datetimeFigureOut">
               <a:rPr lang="en-GB" smtClean="0"/>
-              <a:t>16/02/2016</a:t>
+              <a:t>17/02/2016</a:t>
             </a:fld>
             <a:endParaRPr lang="en-GB"/>
           </a:p>
@@ -3190,11 +3190,7 @@
           <a:p>
             <a:r>
               <a:rPr lang="en-GB" sz="1100" dirty="0" smtClean="0"/>
-              <a:t>Email (varchar 255</a:t>
-            </a:r>
-            <a:r>
-              <a:rPr lang="en-GB" sz="1100" dirty="0" smtClean="0"/>
-              <a:t>)</a:t>
+              <a:t>Email (varchar 255)</a:t>
             </a:r>
           </a:p>
           <a:p>
@@ -3206,7 +3202,6 @@
               <a:rPr lang="en-GB" sz="1100" dirty="0" smtClean="0"/>
               <a:t> (bit) **</a:t>
             </a:r>
-            <a:endParaRPr lang="en-GB" sz="1100" dirty="0" smtClean="0"/>
           </a:p>
           <a:p>
             <a:endParaRPr lang="en-GB" sz="1100" dirty="0"/>
@@ -3214,11 +3209,7 @@
           <a:p>
             <a:r>
               <a:rPr lang="en-GB" sz="800" dirty="0" smtClean="0"/>
-              <a:t>*Avoiding name “User”, as this is a SQL </a:t>
-            </a:r>
-            <a:r>
-              <a:rPr lang="en-GB" sz="800" dirty="0" smtClean="0"/>
-              <a:t>keyword</a:t>
+              <a:t>*Avoiding name “User”, as this is a SQL keyword</a:t>
             </a:r>
           </a:p>
           <a:p>
@@ -3237,7 +3228,6 @@
               <a:rPr lang="en-GB" sz="800" dirty="0" smtClean="0"/>
               <a:t> status is separate from normal permissions, as this is an attribute of the entire person, not just their access at a specific organisation</a:t>
             </a:r>
-            <a:endParaRPr lang="en-GB" sz="800" dirty="0" smtClean="0"/>
           </a:p>
           <a:p>
             <a:endParaRPr lang="en-GB" sz="1100" dirty="0" smtClean="0"/>
@@ -3935,7 +3925,7 @@
         <p:spPr>
           <a:xfrm>
             <a:off x="741405" y="708454"/>
-            <a:ext cx="9737125" cy="3016210"/>
+            <a:ext cx="9737125" cy="3877985"/>
           </a:xfrm>
           <a:prstGeom prst="rect">
             <a:avLst/>
@@ -4038,11 +4028,7 @@
             </a:pPr>
             <a:r>
               <a:rPr lang="en-GB" sz="1400" dirty="0" smtClean="0"/>
-              <a:t>Do we need an audit of logon activity</a:t>
-            </a:r>
-            <a:r>
-              <a:rPr lang="en-GB" sz="1400" dirty="0" smtClean="0"/>
-              <a:t>?</a:t>
+              <a:t>Do we need an audit of logon activity?</a:t>
             </a:r>
           </a:p>
           <a:p>
@@ -4051,9 +4037,67 @@
             </a:pPr>
             <a:r>
               <a:rPr lang="en-GB" sz="1400" strike="sngStrike" dirty="0" smtClean="0"/>
-              <a:t>Need ability to suspend or delete users?</a:t>
-            </a:r>
-            <a:endParaRPr lang="en-GB" sz="1400" strike="sngStrike" dirty="0" smtClean="0"/>
+              <a:t>Need ability to suspend or delete users</a:t>
+            </a:r>
+            <a:r>
+              <a:rPr lang="en-GB" sz="1400" strike="sngStrike" dirty="0" smtClean="0"/>
+              <a:t>?</a:t>
+            </a:r>
+          </a:p>
+          <a:p>
+            <a:pPr marL="342900" indent="-342900">
+              <a:buAutoNum type="arabicParenR"/>
+            </a:pPr>
+            <a:r>
+              <a:rPr lang="en-GB" sz="1400" dirty="0" smtClean="0"/>
+              <a:t>Don’t bother using the </a:t>
+            </a:r>
+            <a:r>
+              <a:rPr lang="en-GB" sz="1400" dirty="0" err="1" smtClean="0"/>
+              <a:t>ForeignKey</a:t>
+            </a:r>
+            <a:r>
+              <a:rPr lang="en-GB" sz="1400" dirty="0" smtClean="0"/>
+              <a:t> constraint in SQL. It makes managing the DB harder when changes need to be made.</a:t>
+            </a:r>
+            <a:endParaRPr lang="en-GB" sz="1400" dirty="0" smtClean="0"/>
+          </a:p>
+          <a:p>
+            <a:pPr marL="342900" indent="-342900">
+              <a:buAutoNum type="arabicParenR"/>
+            </a:pPr>
+            <a:r>
+              <a:rPr lang="en-GB" sz="1400" dirty="0" smtClean="0"/>
+              <a:t>Avoid allowing nulls in columns if possible, as there’s extra overhead that’s rarely required, except with </a:t>
+            </a:r>
+            <a:r>
+              <a:rPr lang="en-GB" sz="1400" dirty="0" err="1" smtClean="0"/>
+              <a:t>UniqueIdentifiers</a:t>
+            </a:r>
+            <a:endParaRPr lang="en-GB" sz="1400" dirty="0" smtClean="0"/>
+          </a:p>
+          <a:p>
+            <a:pPr marL="342900" indent="-342900">
+              <a:buAutoNum type="arabicParenR"/>
+            </a:pPr>
+            <a:r>
+              <a:rPr lang="en-GB" sz="1400" dirty="0" smtClean="0"/>
+              <a:t>With varchar columns, there’s no point having columns less than varchar(255)</a:t>
+            </a:r>
+          </a:p>
+          <a:p>
+            <a:pPr marL="342900" indent="-342900">
+              <a:buAutoNum type="arabicParenR"/>
+            </a:pPr>
+            <a:r>
+              <a:rPr lang="en-GB" sz="1400" dirty="0" smtClean="0"/>
+              <a:t>Tables currently have </a:t>
+            </a:r>
+            <a:r>
+              <a:rPr lang="en-GB" sz="1400" smtClean="0"/>
+              <a:t>no indexes</a:t>
+            </a:r>
+            <a:endParaRPr lang="en-GB" sz="1400" dirty="0" smtClean="0"/>
           </a:p>
           <a:p>
             <a:pPr marL="342900" indent="-342900">
@@ -4438,8 +4482,8 @@
               <a:t>Parameters: JSON of Email and </a:t>
             </a:r>
             <a:r>
-              <a:rPr lang="en-GB" sz="1200" dirty="0" err="1" smtClean="0"/>
-              <a:t>PasswordHash</a:t>
+              <a:rPr lang="en-GB" sz="1200" dirty="0" smtClean="0"/>
+              <a:t>Password</a:t>
             </a:r>
             <a:endParaRPr lang="en-GB" sz="1200" dirty="0" smtClean="0"/>
           </a:p>
@@ -4455,7 +4499,15 @@
           <a:p>
             <a:r>
               <a:rPr lang="en-GB" sz="1000" dirty="0" smtClean="0"/>
-              <a:t>First call, used by a user to authenticate themselves. If the email and password hash match a record in the Person table then that Person record and will be returned along with all the Organisations that the Person has access to. Expectation is that the </a:t>
+              <a:t>First call, used by a user to authenticate themselves. If the email and </a:t>
+            </a:r>
+            <a:r>
+              <a:rPr lang="en-GB" sz="1000" dirty="0" smtClean="0"/>
+              <a:t>password match </a:t>
+            </a:r>
+            <a:r>
+              <a:rPr lang="en-GB" sz="1000" dirty="0" smtClean="0"/>
+              <a:t>a record in the Person table then that Person record and will be returned along with all the Organisations that the Person has access to. Expectation is that the </a:t>
             </a:r>
             <a:r>
               <a:rPr lang="en-GB" sz="1000" dirty="0" err="1" smtClean="0"/>
@@ -4644,7 +4696,7 @@
         <p:spPr>
           <a:xfrm>
             <a:off x="238897" y="1908004"/>
-            <a:ext cx="4173712" cy="1600438"/>
+            <a:ext cx="4173712" cy="1969770"/>
           </a:xfrm>
           <a:prstGeom prst="rect">
             <a:avLst/>
@@ -4658,8 +4710,12 @@
           <a:lstStyle/>
           <a:p>
             <a:r>
+              <a:rPr lang="en-GB" dirty="0" err="1" smtClean="0"/>
+              <a:t>api</a:t>
+            </a:r>
+            <a:r>
               <a:rPr lang="en-GB" dirty="0" smtClean="0"/>
-              <a:t>/</a:t>
+              <a:t>/folder/</a:t>
             </a:r>
             <a:r>
               <a:rPr lang="en-GB" dirty="0" err="1" smtClean="0"/>
@@ -4670,13 +4726,59 @@
           <a:p>
             <a:r>
               <a:rPr lang="en-GB" sz="1200" dirty="0" smtClean="0"/>
-              <a:t>Prerequisites: authenticated password</a:t>
-            </a:r>
-          </a:p>
-          <a:p>
-            <a:r>
-              <a:rPr lang="en-GB" sz="1200" dirty="0" smtClean="0"/>
-              <a:t>Parameters: New folder name and optional Uuid of parent folder</a:t>
+              <a:t>Prerequisites: authenticated </a:t>
+            </a:r>
+            <a:r>
+              <a:rPr lang="en-GB" sz="1200" dirty="0" smtClean="0"/>
+              <a:t>password</a:t>
+            </a:r>
+          </a:p>
+          <a:p>
+            <a:r>
+              <a:rPr lang="en-GB" sz="1200" dirty="0" smtClean="0"/>
+              <a:t>Method: POST</a:t>
+            </a:r>
+            <a:endParaRPr lang="en-GB" sz="1200" dirty="0" smtClean="0"/>
+          </a:p>
+          <a:p>
+            <a:r>
+              <a:rPr lang="en-GB" sz="1200" dirty="0" smtClean="0"/>
+              <a:t>Parameters: </a:t>
+            </a:r>
+            <a:r>
+              <a:rPr lang="en-GB" sz="1200" dirty="0"/>
+              <a:t>{"</a:t>
+            </a:r>
+            <a:r>
+              <a:rPr lang="en-GB" sz="1200" dirty="0" err="1"/>
+              <a:t>folderName</a:t>
+            </a:r>
+            <a:r>
+              <a:rPr lang="en-GB" sz="1200" dirty="0"/>
+              <a:t>": </a:t>
+            </a:r>
+            <a:r>
+              <a:rPr lang="en-GB" sz="1200" dirty="0" smtClean="0"/>
+              <a:t>&lt;new folder name&gt;, “</a:t>
+            </a:r>
+            <a:r>
+              <a:rPr lang="en-GB" sz="1200" dirty="0" err="1" smtClean="0"/>
+              <a:t>parentFolderUuid</a:t>
+            </a:r>
+            <a:r>
+              <a:rPr lang="en-GB" sz="1200" dirty="0" smtClean="0"/>
+              <a:t>”: &lt;optional parent folder&gt;}</a:t>
+            </a:r>
+            <a:endParaRPr lang="en-GB" sz="1200" dirty="0"/>
+          </a:p>
+          <a:p>
+            <a:r>
+              <a:rPr lang="en-GB" sz="1200" dirty="0" smtClean="0"/>
+              <a:t>New </a:t>
+            </a:r>
+            <a:r>
+              <a:rPr lang="en-GB" sz="1200" dirty="0" smtClean="0"/>
+              <a:t>folder name and optional Uuid of parent folder</a:t>
             </a:r>
           </a:p>
           <a:p>
@@ -4805,7 +4907,15 @@
           <a:p>
             <a:r>
               <a:rPr lang="en-GB" sz="1200" dirty="0" smtClean="0"/>
-              <a:t>Parameters: Uuid of new parent folder (or none if moving to top level)</a:t>
+              <a:t>Parameters: </a:t>
+            </a:r>
+            <a:r>
+              <a:rPr lang="en-GB" sz="1200" dirty="0" smtClean="0"/>
+              <a:t>Uuid of folder being moved and Uuid </a:t>
+            </a:r>
+            <a:r>
+              <a:rPr lang="en-GB" sz="1200" dirty="0" smtClean="0"/>
+              <a:t>of new parent folder (or none if moving to top level)</a:t>
             </a:r>
           </a:p>
           <a:p>

</xml_diff>